<commit_message>
update to the new UI
</commit_message>
<xml_diff>
--- a/project/input-new.pptx
+++ b/project/input-new.pptx
@@ -8,6 +8,8 @@
     <p:sldId id="256" r:id="rId7"/>
     <p:sldId id="257" r:id="rId8"/>
     <p:sldId id="258" r:id="rId9"/>
+    <p:sldId id="259" r:id="rId10"/>
+    <p:sldId id="260" r:id="rId11"/>
   </p:sldIdLst>
   <p:sldSz cx="9144000" cy="6858000" type="screen4x3"/>
   <p:notesSz cx="6858000" cy="9144000"/>
@@ -3106,7 +3108,7 @@
           <a:lstStyle/>
           <a:p>
             <a:r>
-              <a:t>Plane Crash in Belgorod region</a:t>
+              <a:t>Slide 1</a:t>
             </a:r>
           </a:p>
         </p:txBody>
@@ -3128,7 +3130,7 @@
           <a:p>
             <a:r>
               <a:rPr sz="1800"/>
-              <a:t>A Russian military transport plane carrying 65 captured Ukrainian soldiers has crashed in the Belgorod region near the Ukraine border. The details of those on board cannot be independently verified.</a:t>
+              <a:t>Introduction</a:t>
             </a:r>
           </a:p>
         </p:txBody>
@@ -3167,7 +3169,7 @@
           <a:lstStyle/>
           <a:p>
             <a:r>
-              <a:t>Possible Missile Cargo</a:t>
+              <a:t>Slide 2</a:t>
             </a:r>
           </a:p>
         </p:txBody>
@@ -3189,7 +3191,7 @@
           <a:p>
             <a:r>
               <a:rPr sz="1800"/>
-              <a:t>Reports suggest that the plane was also carrying missiles for Russia's air defense systems. The Russian defense ministry alleges that Ukraine's air force fired two anti-aircraft missiles at the plane.</a:t>
+              <a:t>Parties Involved</a:t>
             </a:r>
           </a:p>
         </p:txBody>
@@ -3228,7 +3230,7 @@
           <a:lstStyle/>
           <a:p>
             <a:r>
-              <a:t>Cause of the Crash Unknown</a:t>
+              <a:t>Slide 3</a:t>
             </a:r>
           </a:p>
         </p:txBody>
@@ -3250,7 +3252,129 @@
           <a:p>
             <a:r>
               <a:rPr sz="1800"/>
-              <a:t>The cause of the crash is still unknown. Russian and Ukrainian authorities have differing accounts of the incident. The crash has resulted in the cancellation of a planned prisoner exchange between Ukraine and Russia.</a:t>
+              <a:t>Work Description</a:t>
+            </a:r>
+          </a:p>
+        </p:txBody>
+      </p:sp>
+    </p:spTree>
+  </p:cSld>
+  <p:clrMapOvr>
+    <a:masterClrMapping/>
+  </p:clrMapOvr>
+</p:sld>
+</file>
+
+<file path=ppt/slides/slide4.xml><?xml version="1.0" encoding="utf-8"?>
+<p:sld xmlns:a="http://schemas.openxmlformats.org/drawingml/2006/main" xmlns:p="http://schemas.openxmlformats.org/presentationml/2006/main" xmlns:r="http://schemas.openxmlformats.org/officeDocument/2006/relationships">
+  <p:cSld>
+    <p:spTree>
+      <p:nvGrpSpPr>
+        <p:cNvPr id="1" name=""/>
+        <p:cNvGrpSpPr/>
+        <p:nvPr/>
+      </p:nvGrpSpPr>
+      <p:grpSpPr/>
+      <p:sp>
+        <p:nvSpPr>
+          <p:cNvPr id="2" name="Title 1"/>
+          <p:cNvSpPr>
+            <a:spLocks noGrp="1"/>
+          </p:cNvSpPr>
+          <p:nvPr>
+            <p:ph type="title"/>
+          </p:nvPr>
+        </p:nvSpPr>
+        <p:spPr/>
+        <p:txBody>
+          <a:bodyPr/>
+          <a:lstStyle/>
+          <a:p>
+            <a:r>
+              <a:t>Slide 4</a:t>
+            </a:r>
+          </a:p>
+        </p:txBody>
+      </p:sp>
+      <p:sp>
+        <p:nvSpPr>
+          <p:cNvPr id="3" name="Content Placeholder 2"/>
+          <p:cNvSpPr>
+            <a:spLocks noGrp="1"/>
+          </p:cNvSpPr>
+          <p:nvPr>
+            <p:ph idx="1"/>
+          </p:nvPr>
+        </p:nvSpPr>
+        <p:spPr/>
+        <p:txBody>
+          <a:bodyPr/>
+          <a:lstStyle/>
+          <a:p>
+            <a:r>
+              <a:rPr sz="1800"/>
+              <a:t>Agreement Terms</a:t>
+            </a:r>
+          </a:p>
+        </p:txBody>
+      </p:sp>
+    </p:spTree>
+  </p:cSld>
+  <p:clrMapOvr>
+    <a:masterClrMapping/>
+  </p:clrMapOvr>
+</p:sld>
+</file>
+
+<file path=ppt/slides/slide5.xml><?xml version="1.0" encoding="utf-8"?>
+<p:sld xmlns:a="http://schemas.openxmlformats.org/drawingml/2006/main" xmlns:p="http://schemas.openxmlformats.org/presentationml/2006/main" xmlns:r="http://schemas.openxmlformats.org/officeDocument/2006/relationships">
+  <p:cSld>
+    <p:spTree>
+      <p:nvGrpSpPr>
+        <p:cNvPr id="1" name=""/>
+        <p:cNvGrpSpPr/>
+        <p:nvPr/>
+      </p:nvGrpSpPr>
+      <p:grpSpPr/>
+      <p:sp>
+        <p:nvSpPr>
+          <p:cNvPr id="2" name="Title 1"/>
+          <p:cNvSpPr>
+            <a:spLocks noGrp="1"/>
+          </p:cNvSpPr>
+          <p:nvPr>
+            <p:ph type="title"/>
+          </p:nvPr>
+        </p:nvSpPr>
+        <p:spPr/>
+        <p:txBody>
+          <a:bodyPr/>
+          <a:lstStyle/>
+          <a:p>
+            <a:r>
+              <a:t>Slide 5</a:t>
+            </a:r>
+          </a:p>
+        </p:txBody>
+      </p:sp>
+      <p:sp>
+        <p:nvSpPr>
+          <p:cNvPr id="3" name="Content Placeholder 2"/>
+          <p:cNvSpPr>
+            <a:spLocks noGrp="1"/>
+          </p:cNvSpPr>
+          <p:nvPr>
+            <p:ph idx="1"/>
+          </p:nvPr>
+        </p:nvSpPr>
+        <p:spPr/>
+        <p:txBody>
+          <a:bodyPr/>
+          <a:lstStyle/>
+          <a:p>
+            <a:r>
+              <a:rPr sz="1800"/>
+              <a:t>Conclusion</a:t>
             </a:r>
           </a:p>
         </p:txBody>

</xml_diff>